<commit_message>
Lab #6 slides 2/19
</commit_message>
<xml_diff>
--- a/cs447tk_rec5_lab6_feb19.pptx
+++ b/cs447tk_rec5_lab6_feb19.pptx
@@ -5,12 +5,17 @@
     <p:sldMasterId id="2147483660" r:id="rId1"/>
   </p:sldMasterIdLst>
   <p:notesMasterIdLst>
-    <p:notesMasterId r:id="rId5"/>
+    <p:notesMasterId r:id="rId10"/>
   </p:notesMasterIdLst>
   <p:sldIdLst>
     <p:sldId id="258" r:id="rId2"/>
     <p:sldId id="282" r:id="rId3"/>
-    <p:sldId id="299" r:id="rId4"/>
+    <p:sldId id="284" r:id="rId4"/>
+    <p:sldId id="285" r:id="rId5"/>
+    <p:sldId id="286" r:id="rId6"/>
+    <p:sldId id="287" r:id="rId7"/>
+    <p:sldId id="288" r:id="rId8"/>
+    <p:sldId id="289" r:id="rId9"/>
   </p:sldIdLst>
   <p:sldSz cx="9144000" cy="6858000" type="screen4x3"/>
   <p:notesSz cx="6858000" cy="9144000"/>
@@ -3375,7 +3380,7 @@
                   <a:srgbClr val="002060"/>
                 </a:solidFill>
               </a:rPr>
-              <a:t>CS447 Recitation #5: 2/12/18</a:t>
+              <a:t>CS447 Recitation #5: 2/19/18</a:t>
             </a:r>
           </a:p>
         </p:txBody>
@@ -3389,7 +3394,7 @@
         <p:spPr>
           <a:xfrm>
             <a:off x="400146" y="1756103"/>
-            <a:ext cx="8201594" cy="1200329"/>
+            <a:ext cx="8201594" cy="1569660"/>
           </a:xfrm>
           <a:prstGeom prst="rect">
             <a:avLst/>
@@ -3418,6 +3423,16 @@
               <a:t>: </a:t>
             </a:r>
             <a:endParaRPr lang="en-US" sz="2400" dirty="0"/>
+          </a:p>
+          <a:p>
+            <a:pPr marL="457200" indent="-457200">
+              <a:buFont typeface="+mj-lt"/>
+              <a:buAutoNum type="arabicPeriod"/>
+            </a:pPr>
+            <a:r>
+              <a:rPr lang="en-US" sz="2400" dirty="0"/>
+              <a:t>Office hours are 2-4 pm today</a:t>
+            </a:r>
           </a:p>
           <a:p>
             <a:pPr marL="457200" indent="-457200">
@@ -3560,7 +3575,7 @@
         <p:spPr>
           <a:xfrm>
             <a:off x="435315" y="709246"/>
-            <a:ext cx="7698752" cy="4154984"/>
+            <a:ext cx="7698752" cy="5632311"/>
           </a:xfrm>
           <a:prstGeom prst="rect">
             <a:avLst/>
@@ -3591,8 +3606,13 @@
             </a:pPr>
             <a:r>
               <a:rPr lang="en-US" sz="2400" dirty="0"/>
-              <a:t>Page 1:</a:t>
-            </a:r>
+              <a:t>Pages 1-2: Introduction to </a:t>
+            </a:r>
+            <a:r>
+              <a:rPr lang="en-US" sz="2400" dirty="0" err="1"/>
+              <a:t>Logisim</a:t>
+            </a:r>
+            <a:endParaRPr lang="en-US" sz="2400" dirty="0"/>
           </a:p>
           <a:p>
             <a:pPr marL="342900" indent="-342900">
@@ -3608,7 +3628,7 @@
             </a:pPr>
             <a:r>
               <a:rPr lang="en-US" sz="2400" dirty="0"/>
-              <a:t>Page 2:</a:t>
+              <a:t>Pages 2-3: step 1: Create a 1-bit adder logic circuit </a:t>
             </a:r>
           </a:p>
           <a:p>
@@ -3625,7 +3645,24 @@
             </a:pPr>
             <a:r>
               <a:rPr lang="en-US" sz="2400" dirty="0"/>
-              <a:t>Page 3:</a:t>
+              <a:t>Pages 3-5: step 2: Create a 4-bit adder</a:t>
+            </a:r>
+          </a:p>
+          <a:p>
+            <a:pPr marL="342900" indent="-342900">
+              <a:buFont typeface="Arial" panose="020B0604020202020204" pitchFamily="34" charset="0"/>
+              <a:buChar char="•"/>
+            </a:pPr>
+            <a:endParaRPr lang="en-US" sz="2400" dirty="0"/>
+          </a:p>
+          <a:p>
+            <a:pPr marL="342900" indent="-342900">
+              <a:buFont typeface="Arial" panose="020B0604020202020204" pitchFamily="34" charset="0"/>
+              <a:buChar char="•"/>
+            </a:pPr>
+            <a:r>
+              <a:rPr lang="en-US" sz="2400" dirty="0"/>
+              <a:t>Pages 5-6: Step 3: Create a combined addition and subtraction circuit, using the built-in addition and subtraction components.</a:t>
             </a:r>
           </a:p>
           <a:p>
@@ -3690,32 +3727,32 @@
       </p:grpSpPr>
       <p:sp>
         <p:nvSpPr>
-          <p:cNvPr id="6" name="TextBox 5"/>
+          <p:cNvPr id="5" name="TextBox 4"/>
           <p:cNvSpPr txBox="1"/>
           <p:nvPr/>
         </p:nvSpPr>
         <p:spPr>
           <a:xfrm>
             <a:off x="0" y="0"/>
-            <a:ext cx="9027042" cy="523220"/>
+            <a:ext cx="8134066" cy="523220"/>
           </a:xfrm>
           <a:prstGeom prst="rect">
             <a:avLst/>
           </a:prstGeom>
         </p:spPr>
         <p:txBody>
-          <a:bodyPr wrap="square" rtlCol="0">
+          <a:bodyPr rtlCol="0">
             <a:spAutoFit/>
           </a:bodyPr>
           <a:lstStyle/>
           <a:p>
             <a:r>
-              <a:rPr lang="en-US" sz="2800" u="sng" dirty="0">
+              <a:rPr lang="en-US" sz="2800" dirty="0" err="1">
                 <a:solidFill>
                   <a:srgbClr val="002060"/>
                 </a:solidFill>
               </a:rPr>
-              <a:t>Completion during recitation</a:t>
+              <a:t>Logisim</a:t>
             </a:r>
             <a:r>
               <a:rPr lang="en-US" sz="2800" dirty="0">
@@ -3723,17 +3760,17 @@
                   <a:srgbClr val="002060"/>
                 </a:solidFill>
               </a:rPr>
-              <a:t>:</a:t>
-            </a:r>
-          </a:p>
-        </p:txBody>
-      </p:sp>
-      <p:sp>
-        <p:nvSpPr>
-          <p:cNvPr id="7" name="TextBox 6">
+              <a:t>: Creating a basic circuit</a:t>
+            </a:r>
+          </a:p>
+        </p:txBody>
+      </p:sp>
+      <p:sp>
+        <p:nvSpPr>
+          <p:cNvPr id="4" name="TextBox 3">
             <a:extLst>
               <a:ext uri="{FF2B5EF4-FFF2-40B4-BE49-F238E27FC236}">
-                <a16:creationId xmlns:a16="http://schemas.microsoft.com/office/drawing/2014/main" id="{065C2E0B-4A17-4358-B54A-6C3B23FAAEBD}"/>
+                <a16:creationId xmlns:a16="http://schemas.microsoft.com/office/drawing/2014/main" id="{8882E7DC-FE30-4AE7-B38A-A32475F8D4D8}"/>
               </a:ext>
             </a:extLst>
           </p:cNvPr>
@@ -3742,8 +3779,8 @@
         </p:nvSpPr>
         <p:spPr>
           <a:xfrm>
-            <a:off x="-212654" y="738851"/>
-            <a:ext cx="7761768" cy="2246769"/>
+            <a:off x="435315" y="709246"/>
+            <a:ext cx="7698752" cy="3416320"/>
           </a:xfrm>
           <a:prstGeom prst="rect">
             <a:avLst/>
@@ -3755,46 +3792,989 @@
           </a:bodyPr>
           <a:lstStyle/>
           <a:p>
-            <a:pPr marL="971550" lvl="1" indent="-514350">
-              <a:buFont typeface="+mj-lt"/>
-              <a:buAutoNum type="arabicPeriod"/>
+            <a:r>
+              <a:rPr lang="en-US" sz="2400" u="sng" dirty="0"/>
+              <a:t>Download link</a:t>
+            </a:r>
+            <a:r>
+              <a:rPr lang="en-US" sz="2400" dirty="0"/>
+              <a:t>: </a:t>
+            </a:r>
+            <a:r>
+              <a:rPr lang="en-US" sz="2400" dirty="0">
+                <a:hlinkClick r:id="rId2"/>
+              </a:rPr>
+              <a:t>http://www.cburch.com/logisim</a:t>
+            </a:r>
+            <a:endParaRPr lang="en-US" sz="2400" dirty="0"/>
+          </a:p>
+          <a:p>
+            <a:endParaRPr lang="en-US" sz="2400" dirty="0"/>
+          </a:p>
+          <a:p>
+            <a:pPr marL="342900" indent="-342900">
+              <a:buFont typeface="Arial" panose="020B0604020202020204" pitchFamily="34" charset="0"/>
+              <a:buChar char="•"/>
             </a:pPr>
             <a:r>
-              <a:rPr lang="en-US" sz="2800" dirty="0"/>
-              <a:t>You will be asked to</a:t>
-            </a:r>
-          </a:p>
-          <a:p>
-            <a:pPr marL="971550" lvl="1" indent="-514350">
-              <a:buFont typeface="+mj-lt"/>
-              <a:buAutoNum type="arabicPeriod"/>
+              <a:rPr lang="en-US" sz="2400" dirty="0"/>
+              <a:t>Click “Download”, followed by the </a:t>
+            </a:r>
+            <a:r>
+              <a:rPr lang="en-US" sz="2400" dirty="0" err="1"/>
+              <a:t>SourceForge</a:t>
+            </a:r>
+            <a:r>
+              <a:rPr lang="en-US" sz="2400" dirty="0"/>
+              <a:t> link.</a:t>
+            </a:r>
+          </a:p>
+          <a:p>
+            <a:pPr marL="342900" indent="-342900">
+              <a:buFont typeface="Arial" panose="020B0604020202020204" pitchFamily="34" charset="0"/>
+              <a:buChar char="•"/>
             </a:pPr>
-            <a:endParaRPr lang="en-US" sz="2800" dirty="0"/>
-          </a:p>
-          <a:p>
-            <a:pPr marL="971550" lvl="1" indent="-514350">
-              <a:buFont typeface="+mj-lt"/>
-              <a:buAutoNum type="arabicPeriod"/>
+            <a:endParaRPr lang="en-US" sz="2400" dirty="0"/>
+          </a:p>
+          <a:p>
+            <a:pPr marL="342900" indent="-342900">
+              <a:buFont typeface="Arial" panose="020B0604020202020204" pitchFamily="34" charset="0"/>
+              <a:buChar char="•"/>
             </a:pPr>
             <a:r>
-              <a:rPr lang="en-US" sz="2800" dirty="0"/>
-              <a:t>Assignments must be submitted via </a:t>
-            </a:r>
-            <a:r>
-              <a:rPr lang="en-US" sz="2800" dirty="0" err="1"/>
-              <a:t>Courseweb</a:t>
-            </a:r>
-            <a:r>
-              <a:rPr lang="en-US" sz="2800" dirty="0"/>
-              <a:t>, even if checked off during recitation.</a:t>
-            </a:r>
+              <a:rPr lang="en-US" sz="2400" dirty="0"/>
+              <a:t>The downloaded file will be a Java executable.</a:t>
+            </a:r>
+          </a:p>
+          <a:p>
+            <a:pPr marL="342900" indent="-342900">
+              <a:buFont typeface="Arial" panose="020B0604020202020204" pitchFamily="34" charset="0"/>
+              <a:buChar char="•"/>
+            </a:pPr>
+            <a:endParaRPr lang="en-US" sz="2400" dirty="0"/>
+          </a:p>
+          <a:p>
+            <a:endParaRPr lang="en-US" sz="2400" dirty="0"/>
+          </a:p>
+          <a:p>
+            <a:pPr marL="342900" indent="-342900">
+              <a:buFont typeface="Arial" panose="020B0604020202020204" pitchFamily="34" charset="0"/>
+              <a:buChar char="•"/>
+            </a:pPr>
+            <a:endParaRPr lang="en-US" sz="2400" dirty="0"/>
+          </a:p>
+          <a:p>
+            <a:endParaRPr lang="en-US" sz="2400" dirty="0">
+              <a:highlight>
+                <a:srgbClr val="FFFF00"/>
+              </a:highlight>
+            </a:endParaRPr>
           </a:p>
         </p:txBody>
       </p:sp>
     </p:spTree>
     <p:extLst>
       <p:ext uri="{BB962C8B-B14F-4D97-AF65-F5344CB8AC3E}">
-        <p14:creationId xmlns:p14="http://schemas.microsoft.com/office/powerpoint/2010/main" val="502489695"/>
+        <p14:creationId xmlns:p14="http://schemas.microsoft.com/office/powerpoint/2010/main" val="1573764365"/>
+      </p:ext>
+    </p:extLst>
+  </p:cSld>
+  <p:clrMapOvr>
+    <a:masterClrMapping/>
+  </p:clrMapOvr>
+</p:sld>
+</file>
+
+<file path=ppt/slides/slide4.xml><?xml version="1.0" encoding="utf-8"?>
+<p:sld xmlns:a="http://schemas.openxmlformats.org/drawingml/2006/main" xmlns:r="http://schemas.openxmlformats.org/officeDocument/2006/relationships" xmlns:p="http://schemas.openxmlformats.org/presentationml/2006/main">
+  <p:cSld>
+    <p:spTree>
+      <p:nvGrpSpPr>
+        <p:cNvPr id="1" name=""/>
+        <p:cNvGrpSpPr/>
+        <p:nvPr/>
+      </p:nvGrpSpPr>
+      <p:grpSpPr>
+        <a:xfrm>
+          <a:off x="0" y="0"/>
+          <a:ext cx="0" cy="0"/>
+          <a:chOff x="0" y="0"/>
+          <a:chExt cx="0" cy="0"/>
+        </a:xfrm>
+      </p:grpSpPr>
+      <p:sp>
+        <p:nvSpPr>
+          <p:cNvPr id="5" name="TextBox 4"/>
+          <p:cNvSpPr txBox="1"/>
+          <p:nvPr/>
+        </p:nvSpPr>
+        <p:spPr>
+          <a:xfrm>
+            <a:off x="0" y="0"/>
+            <a:ext cx="8134066" cy="523220"/>
+          </a:xfrm>
+          <a:prstGeom prst="rect">
+            <a:avLst/>
+          </a:prstGeom>
+        </p:spPr>
+        <p:txBody>
+          <a:bodyPr rtlCol="0">
+            <a:spAutoFit/>
+          </a:bodyPr>
+          <a:lstStyle/>
+          <a:p>
+            <a:r>
+              <a:rPr lang="en-US" sz="2800" dirty="0" err="1">
+                <a:solidFill>
+                  <a:srgbClr val="002060"/>
+                </a:solidFill>
+              </a:rPr>
+              <a:t>Logisim</a:t>
+            </a:r>
+            <a:r>
+              <a:rPr lang="en-US" sz="2800" dirty="0">
+                <a:solidFill>
+                  <a:srgbClr val="002060"/>
+                </a:solidFill>
+              </a:rPr>
+              <a:t>: Creating a basic circuit</a:t>
+            </a:r>
+          </a:p>
+        </p:txBody>
+      </p:sp>
+      <p:sp>
+        <p:nvSpPr>
+          <p:cNvPr id="4" name="TextBox 3">
+            <a:extLst>
+              <a:ext uri="{FF2B5EF4-FFF2-40B4-BE49-F238E27FC236}">
+                <a16:creationId xmlns:a16="http://schemas.microsoft.com/office/drawing/2014/main" id="{8882E7DC-FE30-4AE7-B38A-A32475F8D4D8}"/>
+              </a:ext>
+            </a:extLst>
+          </p:cNvPr>
+          <p:cNvSpPr txBox="1"/>
+          <p:nvPr/>
+        </p:nvSpPr>
+        <p:spPr>
+          <a:xfrm>
+            <a:off x="435315" y="709246"/>
+            <a:ext cx="7698752" cy="1569660"/>
+          </a:xfrm>
+          <a:prstGeom prst="rect">
+            <a:avLst/>
+          </a:prstGeom>
+        </p:spPr>
+        <p:txBody>
+          <a:bodyPr wrap="square" rtlCol="0">
+            <a:spAutoFit/>
+          </a:bodyPr>
+          <a:lstStyle/>
+          <a:p>
+            <a:r>
+              <a:rPr lang="en-US" sz="2400" dirty="0"/>
+              <a:t>Demo in recitation</a:t>
+            </a:r>
+          </a:p>
+          <a:p>
+            <a:endParaRPr lang="en-US" sz="2400" dirty="0"/>
+          </a:p>
+          <a:p>
+            <a:pPr marL="342900" indent="-342900">
+              <a:buFont typeface="Arial" panose="020B0604020202020204" pitchFamily="34" charset="0"/>
+              <a:buChar char="•"/>
+            </a:pPr>
+            <a:endParaRPr lang="en-US" sz="2400" dirty="0"/>
+          </a:p>
+          <a:p>
+            <a:endParaRPr lang="en-US" sz="2400" dirty="0">
+              <a:highlight>
+                <a:srgbClr val="FFFF00"/>
+              </a:highlight>
+            </a:endParaRPr>
+          </a:p>
+        </p:txBody>
+      </p:sp>
+    </p:spTree>
+    <p:extLst>
+      <p:ext uri="{BB962C8B-B14F-4D97-AF65-F5344CB8AC3E}">
+        <p14:creationId xmlns:p14="http://schemas.microsoft.com/office/powerpoint/2010/main" val="1295539162"/>
+      </p:ext>
+    </p:extLst>
+  </p:cSld>
+  <p:clrMapOvr>
+    <a:masterClrMapping/>
+  </p:clrMapOvr>
+</p:sld>
+</file>
+
+<file path=ppt/slides/slide5.xml><?xml version="1.0" encoding="utf-8"?>
+<p:sld xmlns:a="http://schemas.openxmlformats.org/drawingml/2006/main" xmlns:r="http://schemas.openxmlformats.org/officeDocument/2006/relationships" xmlns:p="http://schemas.openxmlformats.org/presentationml/2006/main">
+  <p:cSld>
+    <p:spTree>
+      <p:nvGrpSpPr>
+        <p:cNvPr id="1" name=""/>
+        <p:cNvGrpSpPr/>
+        <p:nvPr/>
+      </p:nvGrpSpPr>
+      <p:grpSpPr>
+        <a:xfrm>
+          <a:off x="0" y="0"/>
+          <a:ext cx="0" cy="0"/>
+          <a:chOff x="0" y="0"/>
+          <a:chExt cx="0" cy="0"/>
+        </a:xfrm>
+      </p:grpSpPr>
+      <p:sp>
+        <p:nvSpPr>
+          <p:cNvPr id="5" name="TextBox 4"/>
+          <p:cNvSpPr txBox="1"/>
+          <p:nvPr/>
+        </p:nvSpPr>
+        <p:spPr>
+          <a:xfrm>
+            <a:off x="0" y="0"/>
+            <a:ext cx="8134066" cy="523220"/>
+          </a:xfrm>
+          <a:prstGeom prst="rect">
+            <a:avLst/>
+          </a:prstGeom>
+        </p:spPr>
+        <p:txBody>
+          <a:bodyPr rtlCol="0">
+            <a:spAutoFit/>
+          </a:bodyPr>
+          <a:lstStyle/>
+          <a:p>
+            <a:r>
+              <a:rPr lang="en-US" sz="2800" dirty="0">
+                <a:solidFill>
+                  <a:srgbClr val="002060"/>
+                </a:solidFill>
+              </a:rPr>
+              <a:t>Task #1: Create a 1-bit adder circuit</a:t>
+            </a:r>
+          </a:p>
+        </p:txBody>
+      </p:sp>
+      <p:pic>
+        <p:nvPicPr>
+          <p:cNvPr id="2" name="Picture 1">
+            <a:extLst>
+              <a:ext uri="{FF2B5EF4-FFF2-40B4-BE49-F238E27FC236}">
+                <a16:creationId xmlns:a16="http://schemas.microsoft.com/office/drawing/2014/main" id="{805BBFFC-97DD-4F2D-9D02-A1F019673CC9}"/>
+              </a:ext>
+            </a:extLst>
+          </p:cNvPr>
+          <p:cNvPicPr>
+            <a:picLocks noChangeAspect="1"/>
+          </p:cNvPicPr>
+          <p:nvPr/>
+        </p:nvPicPr>
+        <p:blipFill>
+          <a:blip r:embed="rId2"/>
+          <a:stretch>
+            <a:fillRect/>
+          </a:stretch>
+        </p:blipFill>
+        <p:spPr>
+          <a:xfrm>
+            <a:off x="284263" y="725186"/>
+            <a:ext cx="5076897" cy="4930547"/>
+          </a:xfrm>
+          <a:prstGeom prst="rect">
+            <a:avLst/>
+          </a:prstGeom>
+        </p:spPr>
+      </p:pic>
+      <p:sp>
+        <p:nvSpPr>
+          <p:cNvPr id="3" name="TextBox 2">
+            <a:extLst>
+              <a:ext uri="{FF2B5EF4-FFF2-40B4-BE49-F238E27FC236}">
+                <a16:creationId xmlns:a16="http://schemas.microsoft.com/office/drawing/2014/main" id="{305E1A89-A0B4-4072-B712-FBAB06612F74}"/>
+              </a:ext>
+            </a:extLst>
+          </p:cNvPr>
+          <p:cNvSpPr txBox="1"/>
+          <p:nvPr/>
+        </p:nvSpPr>
+        <p:spPr>
+          <a:xfrm>
+            <a:off x="5738191" y="261610"/>
+            <a:ext cx="3121546" cy="4247317"/>
+          </a:xfrm>
+          <a:prstGeom prst="rect">
+            <a:avLst/>
+          </a:prstGeom>
+          <a:noFill/>
+        </p:spPr>
+        <p:txBody>
+          <a:bodyPr wrap="square" rtlCol="0">
+            <a:spAutoFit/>
+          </a:bodyPr>
+          <a:lstStyle/>
+          <a:p>
+            <a:pPr marL="285750" indent="-285750">
+              <a:buFont typeface="Arial" panose="020B0604020202020204" pitchFamily="34" charset="0"/>
+              <a:buChar char="•"/>
+            </a:pPr>
+            <a:r>
+              <a:rPr lang="en-US" dirty="0"/>
+              <a:t>This blueprint specifies exactly what needs to be done.</a:t>
+            </a:r>
+          </a:p>
+          <a:p>
+            <a:pPr marL="285750" indent="-285750">
+              <a:buFont typeface="Arial" panose="020B0604020202020204" pitchFamily="34" charset="0"/>
+              <a:buChar char="•"/>
+            </a:pPr>
+            <a:endParaRPr lang="en-US" dirty="0"/>
+          </a:p>
+          <a:p>
+            <a:pPr marL="285750" indent="-285750">
+              <a:buFont typeface="Arial" panose="020B0604020202020204" pitchFamily="34" charset="0"/>
+              <a:buChar char="•"/>
+            </a:pPr>
+            <a:r>
+              <a:rPr lang="en-US" dirty="0"/>
+              <a:t>It can stand for one column in a multibit adder, and so it contains inputs and outputs for both A, B, and the carry-in bit.</a:t>
+            </a:r>
+          </a:p>
+          <a:p>
+            <a:pPr marL="285750" indent="-285750">
+              <a:buFont typeface="Arial" panose="020B0604020202020204" pitchFamily="34" charset="0"/>
+              <a:buChar char="•"/>
+            </a:pPr>
+            <a:endParaRPr lang="en-US" dirty="0"/>
+          </a:p>
+          <a:p>
+            <a:pPr marL="285750" indent="-285750">
+              <a:buFont typeface="Arial" panose="020B0604020202020204" pitchFamily="34" charset="0"/>
+              <a:buChar char="•"/>
+            </a:pPr>
+            <a:r>
+              <a:rPr lang="en-US" u="sng" dirty="0"/>
+              <a:t>Table from lecture slides</a:t>
+            </a:r>
+            <a:r>
+              <a:rPr lang="en-US" dirty="0"/>
+              <a:t>:</a:t>
+            </a:r>
+          </a:p>
+          <a:p>
+            <a:pPr marL="285750" indent="-285750">
+              <a:buFont typeface="Arial" panose="020B0604020202020204" pitchFamily="34" charset="0"/>
+              <a:buChar char="•"/>
+            </a:pPr>
+            <a:endParaRPr lang="en-US" dirty="0"/>
+          </a:p>
+          <a:p>
+            <a:pPr marL="285750" indent="-285750">
+              <a:buFont typeface="Arial" panose="020B0604020202020204" pitchFamily="34" charset="0"/>
+              <a:buChar char="•"/>
+            </a:pPr>
+            <a:endParaRPr lang="en-US" dirty="0"/>
+          </a:p>
+          <a:p>
+            <a:pPr marL="285750" indent="-285750">
+              <a:buFont typeface="Arial" panose="020B0604020202020204" pitchFamily="34" charset="0"/>
+              <a:buChar char="•"/>
+            </a:pPr>
+            <a:endParaRPr lang="en-US" dirty="0"/>
+          </a:p>
+          <a:p>
+            <a:pPr marL="285750" indent="-285750">
+              <a:buFont typeface="Arial" panose="020B0604020202020204" pitchFamily="34" charset="0"/>
+              <a:buChar char="•"/>
+            </a:pPr>
+            <a:endParaRPr lang="en-US" dirty="0"/>
+          </a:p>
+        </p:txBody>
+      </p:sp>
+      <p:pic>
+        <p:nvPicPr>
+          <p:cNvPr id="6" name="Picture 5">
+            <a:extLst>
+              <a:ext uri="{FF2B5EF4-FFF2-40B4-BE49-F238E27FC236}">
+                <a16:creationId xmlns:a16="http://schemas.microsoft.com/office/drawing/2014/main" id="{FD7170A2-2FC9-4881-AEB1-CD900B5875D9}"/>
+              </a:ext>
+            </a:extLst>
+          </p:cNvPr>
+          <p:cNvPicPr>
+            <a:picLocks noChangeAspect="1"/>
+          </p:cNvPicPr>
+          <p:nvPr/>
+        </p:nvPicPr>
+        <p:blipFill>
+          <a:blip r:embed="rId3"/>
+          <a:stretch>
+            <a:fillRect/>
+          </a:stretch>
+        </p:blipFill>
+        <p:spPr>
+          <a:xfrm>
+            <a:off x="6153229" y="3429000"/>
+            <a:ext cx="2610975" cy="2813578"/>
+          </a:xfrm>
+          <a:prstGeom prst="rect">
+            <a:avLst/>
+          </a:prstGeom>
+        </p:spPr>
+      </p:pic>
+    </p:spTree>
+    <p:extLst>
+      <p:ext uri="{BB962C8B-B14F-4D97-AF65-F5344CB8AC3E}">
+        <p14:creationId xmlns:p14="http://schemas.microsoft.com/office/powerpoint/2010/main" val="1594142878"/>
+      </p:ext>
+    </p:extLst>
+  </p:cSld>
+  <p:clrMapOvr>
+    <a:masterClrMapping/>
+  </p:clrMapOvr>
+</p:sld>
+</file>
+
+<file path=ppt/slides/slide6.xml><?xml version="1.0" encoding="utf-8"?>
+<p:sld xmlns:a="http://schemas.openxmlformats.org/drawingml/2006/main" xmlns:r="http://schemas.openxmlformats.org/officeDocument/2006/relationships" xmlns:p="http://schemas.openxmlformats.org/presentationml/2006/main">
+  <p:cSld>
+    <p:spTree>
+      <p:nvGrpSpPr>
+        <p:cNvPr id="1" name=""/>
+        <p:cNvGrpSpPr/>
+        <p:nvPr/>
+      </p:nvGrpSpPr>
+      <p:grpSpPr>
+        <a:xfrm>
+          <a:off x="0" y="0"/>
+          <a:ext cx="0" cy="0"/>
+          <a:chOff x="0" y="0"/>
+          <a:chExt cx="0" cy="0"/>
+        </a:xfrm>
+      </p:grpSpPr>
+      <p:sp>
+        <p:nvSpPr>
+          <p:cNvPr id="5" name="TextBox 4"/>
+          <p:cNvSpPr txBox="1"/>
+          <p:nvPr/>
+        </p:nvSpPr>
+        <p:spPr>
+          <a:xfrm>
+            <a:off x="0" y="0"/>
+            <a:ext cx="8134066" cy="523220"/>
+          </a:xfrm>
+          <a:prstGeom prst="rect">
+            <a:avLst/>
+          </a:prstGeom>
+        </p:spPr>
+        <p:txBody>
+          <a:bodyPr rtlCol="0">
+            <a:spAutoFit/>
+          </a:bodyPr>
+          <a:lstStyle/>
+          <a:p>
+            <a:r>
+              <a:rPr lang="en-US" sz="2800" dirty="0">
+                <a:solidFill>
+                  <a:srgbClr val="002060"/>
+                </a:solidFill>
+              </a:rPr>
+              <a:t>Task #2: Create a 4-bit adder circuit</a:t>
+            </a:r>
+          </a:p>
+        </p:txBody>
+      </p:sp>
+      <p:sp>
+        <p:nvSpPr>
+          <p:cNvPr id="3" name="TextBox 2">
+            <a:extLst>
+              <a:ext uri="{FF2B5EF4-FFF2-40B4-BE49-F238E27FC236}">
+                <a16:creationId xmlns:a16="http://schemas.microsoft.com/office/drawing/2014/main" id="{305E1A89-A0B4-4072-B712-FBAB06612F74}"/>
+              </a:ext>
+            </a:extLst>
+          </p:cNvPr>
+          <p:cNvSpPr txBox="1"/>
+          <p:nvPr/>
+        </p:nvSpPr>
+        <p:spPr>
+          <a:xfrm>
+            <a:off x="5738191" y="102586"/>
+            <a:ext cx="3121546" cy="7155805"/>
+          </a:xfrm>
+          <a:prstGeom prst="rect">
+            <a:avLst/>
+          </a:prstGeom>
+          <a:noFill/>
+        </p:spPr>
+        <p:txBody>
+          <a:bodyPr wrap="square" rtlCol="0">
+            <a:spAutoFit/>
+          </a:bodyPr>
+          <a:lstStyle/>
+          <a:p>
+            <a:pPr marL="285750" indent="-285750">
+              <a:buFont typeface="Arial" panose="020B0604020202020204" pitchFamily="34" charset="0"/>
+              <a:buChar char="•"/>
+            </a:pPr>
+            <a:r>
+              <a:rPr lang="en-US" sz="1700" dirty="0"/>
+              <a:t>This involves chaining together four of the 1-bit adders that you created in the first step (the blank boxes in the image).</a:t>
+            </a:r>
+          </a:p>
+          <a:p>
+            <a:pPr marL="285750" indent="-285750">
+              <a:buFont typeface="Arial" panose="020B0604020202020204" pitchFamily="34" charset="0"/>
+              <a:buChar char="•"/>
+            </a:pPr>
+            <a:endParaRPr lang="en-US" sz="1700" dirty="0"/>
+          </a:p>
+          <a:p>
+            <a:pPr marL="285750" indent="-285750">
+              <a:buFont typeface="Arial" panose="020B0604020202020204" pitchFamily="34" charset="0"/>
+              <a:buChar char="•"/>
+            </a:pPr>
+            <a:r>
+              <a:rPr lang="en-US" sz="1700" dirty="0"/>
+              <a:t>You will need to adjust the bit width of the inputs/outputs to accommodate 4 bits.</a:t>
+            </a:r>
+          </a:p>
+          <a:p>
+            <a:pPr marL="285750" indent="-285750">
+              <a:buFont typeface="Arial" panose="020B0604020202020204" pitchFamily="34" charset="0"/>
+              <a:buChar char="•"/>
+            </a:pPr>
+            <a:endParaRPr lang="en-US" sz="1700" dirty="0"/>
+          </a:p>
+          <a:p>
+            <a:pPr marL="285750" indent="-285750">
+              <a:buFont typeface="Arial" panose="020B0604020202020204" pitchFamily="34" charset="0"/>
+              <a:buChar char="•"/>
+            </a:pPr>
+            <a:r>
+              <a:rPr lang="en-US" sz="1700" dirty="0"/>
+              <a:t>The bold black lines indicate “splitters”, which can be used to separately route the four bits heading out of an input node (or into an output node).</a:t>
+            </a:r>
+          </a:p>
+          <a:p>
+            <a:pPr marL="285750" indent="-285750">
+              <a:buFont typeface="Arial" panose="020B0604020202020204" pitchFamily="34" charset="0"/>
+              <a:buChar char="•"/>
+            </a:pPr>
+            <a:endParaRPr lang="en-US" sz="1700" dirty="0"/>
+          </a:p>
+          <a:p>
+            <a:pPr marL="285750" indent="-285750">
+              <a:buFont typeface="Arial" panose="020B0604020202020204" pitchFamily="34" charset="0"/>
+              <a:buChar char="•"/>
+            </a:pPr>
+            <a:r>
+              <a:rPr lang="en-US" sz="1700" dirty="0"/>
+              <a:t>The grey box at top is a constant input of 0 (see “Constant” under “Wiring”); this represents the constant 0 carry-in bit for the LSB column.</a:t>
+            </a:r>
+          </a:p>
+          <a:p>
+            <a:pPr marL="285750" indent="-285750">
+              <a:buFont typeface="Arial" panose="020B0604020202020204" pitchFamily="34" charset="0"/>
+              <a:buChar char="•"/>
+            </a:pPr>
+            <a:endParaRPr lang="en-US" sz="1700" dirty="0"/>
+          </a:p>
+          <a:p>
+            <a:pPr marL="285750" indent="-285750">
+              <a:buFont typeface="Arial" panose="020B0604020202020204" pitchFamily="34" charset="0"/>
+              <a:buChar char="•"/>
+            </a:pPr>
+            <a:endParaRPr lang="en-US" sz="1700" dirty="0"/>
+          </a:p>
+          <a:p>
+            <a:pPr marL="285750" indent="-285750">
+              <a:buFont typeface="Arial" panose="020B0604020202020204" pitchFamily="34" charset="0"/>
+              <a:buChar char="•"/>
+            </a:pPr>
+            <a:endParaRPr lang="en-US" sz="1700" dirty="0"/>
+          </a:p>
+          <a:p>
+            <a:pPr marL="285750" indent="-285750">
+              <a:buFont typeface="Arial" panose="020B0604020202020204" pitchFamily="34" charset="0"/>
+              <a:buChar char="•"/>
+            </a:pPr>
+            <a:endParaRPr lang="en-US" sz="1700" dirty="0"/>
+          </a:p>
+        </p:txBody>
+      </p:sp>
+      <p:pic>
+        <p:nvPicPr>
+          <p:cNvPr id="4" name="Picture 3">
+            <a:extLst>
+              <a:ext uri="{FF2B5EF4-FFF2-40B4-BE49-F238E27FC236}">
+                <a16:creationId xmlns:a16="http://schemas.microsoft.com/office/drawing/2014/main" id="{102E4761-3E5B-418A-8E27-59D2AD6840C7}"/>
+              </a:ext>
+            </a:extLst>
+          </p:cNvPr>
+          <p:cNvPicPr>
+            <a:picLocks noChangeAspect="1"/>
+          </p:cNvPicPr>
+          <p:nvPr/>
+        </p:nvPicPr>
+        <p:blipFill>
+          <a:blip r:embed="rId2"/>
+          <a:stretch>
+            <a:fillRect/>
+          </a:stretch>
+        </p:blipFill>
+        <p:spPr>
+          <a:xfrm>
+            <a:off x="178247" y="528830"/>
+            <a:ext cx="5303520" cy="4452733"/>
+          </a:xfrm>
+          <a:prstGeom prst="rect">
+            <a:avLst/>
+          </a:prstGeom>
+        </p:spPr>
+      </p:pic>
+    </p:spTree>
+    <p:extLst>
+      <p:ext uri="{BB962C8B-B14F-4D97-AF65-F5344CB8AC3E}">
+        <p14:creationId xmlns:p14="http://schemas.microsoft.com/office/powerpoint/2010/main" val="723742141"/>
+      </p:ext>
+    </p:extLst>
+  </p:cSld>
+  <p:clrMapOvr>
+    <a:masterClrMapping/>
+  </p:clrMapOvr>
+</p:sld>
+</file>
+
+<file path=ppt/slides/slide7.xml><?xml version="1.0" encoding="utf-8"?>
+<p:sld xmlns:a="http://schemas.openxmlformats.org/drawingml/2006/main" xmlns:r="http://schemas.openxmlformats.org/officeDocument/2006/relationships" xmlns:p="http://schemas.openxmlformats.org/presentationml/2006/main">
+  <p:cSld>
+    <p:spTree>
+      <p:nvGrpSpPr>
+        <p:cNvPr id="1" name=""/>
+        <p:cNvGrpSpPr/>
+        <p:nvPr/>
+      </p:nvGrpSpPr>
+      <p:grpSpPr>
+        <a:xfrm>
+          <a:off x="0" y="0"/>
+          <a:ext cx="0" cy="0"/>
+          <a:chOff x="0" y="0"/>
+          <a:chExt cx="0" cy="0"/>
+        </a:xfrm>
+      </p:grpSpPr>
+      <p:sp>
+        <p:nvSpPr>
+          <p:cNvPr id="5" name="TextBox 4"/>
+          <p:cNvSpPr txBox="1"/>
+          <p:nvPr/>
+        </p:nvSpPr>
+        <p:spPr>
+          <a:xfrm>
+            <a:off x="0" y="0"/>
+            <a:ext cx="8653670" cy="523220"/>
+          </a:xfrm>
+          <a:prstGeom prst="rect">
+            <a:avLst/>
+          </a:prstGeom>
+        </p:spPr>
+        <p:txBody>
+          <a:bodyPr wrap="square" rtlCol="0">
+            <a:spAutoFit/>
+          </a:bodyPr>
+          <a:lstStyle/>
+          <a:p>
+            <a:r>
+              <a:rPr lang="en-US" sz="2800" dirty="0">
+                <a:solidFill>
+                  <a:srgbClr val="002060"/>
+                </a:solidFill>
+              </a:rPr>
+              <a:t>Task #3: Create a combined addition/subtraction circuit</a:t>
+            </a:r>
+          </a:p>
+        </p:txBody>
+      </p:sp>
+      <p:pic>
+        <p:nvPicPr>
+          <p:cNvPr id="7" name="Picture 6">
+            <a:extLst>
+              <a:ext uri="{FF2B5EF4-FFF2-40B4-BE49-F238E27FC236}">
+                <a16:creationId xmlns:a16="http://schemas.microsoft.com/office/drawing/2014/main" id="{57677FBE-E905-4104-AAE0-ACB08BA110F6}"/>
+              </a:ext>
+            </a:extLst>
+          </p:cNvPr>
+          <p:cNvPicPr>
+            <a:picLocks noChangeAspect="1"/>
+          </p:cNvPicPr>
+          <p:nvPr/>
+        </p:nvPicPr>
+        <p:blipFill>
+          <a:blip r:embed="rId2"/>
+          <a:stretch>
+            <a:fillRect/>
+          </a:stretch>
+        </p:blipFill>
+        <p:spPr>
+          <a:xfrm>
+            <a:off x="234082" y="427814"/>
+            <a:ext cx="5548323" cy="3166406"/>
+          </a:xfrm>
+          <a:prstGeom prst="rect">
+            <a:avLst/>
+          </a:prstGeom>
+        </p:spPr>
+      </p:pic>
+      <p:sp>
+        <p:nvSpPr>
+          <p:cNvPr id="8" name="TextBox 7">
+            <a:extLst>
+              <a:ext uri="{FF2B5EF4-FFF2-40B4-BE49-F238E27FC236}">
+                <a16:creationId xmlns:a16="http://schemas.microsoft.com/office/drawing/2014/main" id="{6701D4C9-2E59-4D7E-9DD9-B2C90D01FC20}"/>
+              </a:ext>
+            </a:extLst>
+          </p:cNvPr>
+          <p:cNvSpPr txBox="1"/>
+          <p:nvPr/>
+        </p:nvSpPr>
+        <p:spPr>
+          <a:xfrm>
+            <a:off x="5782405" y="619420"/>
+            <a:ext cx="3121546" cy="6555641"/>
+          </a:xfrm>
+          <a:prstGeom prst="rect">
+            <a:avLst/>
+          </a:prstGeom>
+          <a:noFill/>
+        </p:spPr>
+        <p:txBody>
+          <a:bodyPr wrap="square" rtlCol="0">
+            <a:spAutoFit/>
+          </a:bodyPr>
+          <a:lstStyle/>
+          <a:p>
+            <a:pPr marL="285750" indent="-285750">
+              <a:buFont typeface="Arial" panose="020B0604020202020204" pitchFamily="34" charset="0"/>
+              <a:buChar char="•"/>
+            </a:pPr>
+            <a:r>
+              <a:rPr lang="en-US" sz="2000" dirty="0"/>
+              <a:t>This should handle 8-bit numbers.</a:t>
+            </a:r>
+          </a:p>
+          <a:p>
+            <a:pPr marL="285750" indent="-285750">
+              <a:buFont typeface="Arial" panose="020B0604020202020204" pitchFamily="34" charset="0"/>
+              <a:buChar char="•"/>
+            </a:pPr>
+            <a:endParaRPr lang="en-US" sz="2000" dirty="0"/>
+          </a:p>
+          <a:p>
+            <a:pPr marL="285750" indent="-285750">
+              <a:buFont typeface="Arial" panose="020B0604020202020204" pitchFamily="34" charset="0"/>
+              <a:buChar char="•"/>
+            </a:pPr>
+            <a:r>
+              <a:rPr lang="en-US" sz="2000" dirty="0"/>
+              <a:t>You will be allowed to use </a:t>
+            </a:r>
+            <a:r>
+              <a:rPr lang="en-US" sz="2000" dirty="0" err="1"/>
+              <a:t>Logisim’s</a:t>
+            </a:r>
+            <a:r>
+              <a:rPr lang="en-US" sz="2000" dirty="0"/>
+              <a:t> built-in adder and </a:t>
+            </a:r>
+            <a:r>
+              <a:rPr lang="en-US" sz="2000" dirty="0" err="1"/>
+              <a:t>subtracter</a:t>
+            </a:r>
+            <a:r>
+              <a:rPr lang="en-US" sz="2000" dirty="0"/>
+              <a:t> for this step. </a:t>
+            </a:r>
+          </a:p>
+          <a:p>
+            <a:pPr marL="285750" indent="-285750">
+              <a:buFont typeface="Arial" panose="020B0604020202020204" pitchFamily="34" charset="0"/>
+              <a:buChar char="•"/>
+            </a:pPr>
+            <a:endParaRPr lang="en-US" sz="2000" dirty="0"/>
+          </a:p>
+          <a:p>
+            <a:pPr marL="285750" indent="-285750">
+              <a:buFont typeface="Arial" panose="020B0604020202020204" pitchFamily="34" charset="0"/>
+              <a:buChar char="•"/>
+            </a:pPr>
+            <a:r>
+              <a:rPr lang="en-US" sz="2000" dirty="0"/>
+              <a:t>The probes let you visualize the results on the wires themselves.</a:t>
+            </a:r>
+          </a:p>
+          <a:p>
+            <a:pPr marL="285750" indent="-285750">
+              <a:buFont typeface="Arial" panose="020B0604020202020204" pitchFamily="34" charset="0"/>
+              <a:buChar char="•"/>
+            </a:pPr>
+            <a:endParaRPr lang="en-US" sz="2000" dirty="0"/>
+          </a:p>
+          <a:p>
+            <a:pPr marL="285750" indent="-285750">
+              <a:buFont typeface="Arial" panose="020B0604020202020204" pitchFamily="34" charset="0"/>
+              <a:buChar char="•"/>
+            </a:pPr>
+            <a:r>
+              <a:rPr lang="en-US" sz="2000" dirty="0"/>
+              <a:t>The multiplexer (and the operation input) serves as selector between the two inputs that could be displayed in the output node.</a:t>
+            </a:r>
+          </a:p>
+          <a:p>
+            <a:endParaRPr lang="en-US" sz="2000" dirty="0"/>
+          </a:p>
+          <a:p>
+            <a:pPr marL="285750" indent="-285750">
+              <a:buFont typeface="Arial" panose="020B0604020202020204" pitchFamily="34" charset="0"/>
+              <a:buChar char="•"/>
+            </a:pPr>
+            <a:endParaRPr lang="en-US" sz="2000" dirty="0"/>
+          </a:p>
+          <a:p>
+            <a:pPr marL="285750" indent="-285750">
+              <a:buFont typeface="Arial" panose="020B0604020202020204" pitchFamily="34" charset="0"/>
+              <a:buChar char="•"/>
+            </a:pPr>
+            <a:endParaRPr lang="en-US" sz="2000" dirty="0"/>
+          </a:p>
+        </p:txBody>
+      </p:sp>
+    </p:spTree>
+    <p:extLst>
+      <p:ext uri="{BB962C8B-B14F-4D97-AF65-F5344CB8AC3E}">
+        <p14:creationId xmlns:p14="http://schemas.microsoft.com/office/powerpoint/2010/main" val="3350010136"/>
+      </p:ext>
+    </p:extLst>
+  </p:cSld>
+  <p:clrMapOvr>
+    <a:masterClrMapping/>
+  </p:clrMapOvr>
+</p:sld>
+</file>
+
+<file path=ppt/slides/slide8.xml><?xml version="1.0" encoding="utf-8"?>
+<p:sld xmlns:a="http://schemas.openxmlformats.org/drawingml/2006/main" xmlns:r="http://schemas.openxmlformats.org/officeDocument/2006/relationships" xmlns:p="http://schemas.openxmlformats.org/presentationml/2006/main">
+  <p:cSld>
+    <p:spTree>
+      <p:nvGrpSpPr>
+        <p:cNvPr id="1" name=""/>
+        <p:cNvGrpSpPr/>
+        <p:nvPr/>
+      </p:nvGrpSpPr>
+      <p:grpSpPr>
+        <a:xfrm>
+          <a:off x="0" y="0"/>
+          <a:ext cx="0" cy="0"/>
+          <a:chOff x="0" y="0"/>
+          <a:chExt cx="0" cy="0"/>
+        </a:xfrm>
+      </p:grpSpPr>
+      <p:sp>
+        <p:nvSpPr>
+          <p:cNvPr id="5" name="TextBox 4"/>
+          <p:cNvSpPr txBox="1"/>
+          <p:nvPr/>
+        </p:nvSpPr>
+        <p:spPr>
+          <a:xfrm>
+            <a:off x="0" y="0"/>
+            <a:ext cx="8653670" cy="523220"/>
+          </a:xfrm>
+          <a:prstGeom prst="rect">
+            <a:avLst/>
+          </a:prstGeom>
+        </p:spPr>
+        <p:txBody>
+          <a:bodyPr wrap="square" rtlCol="0">
+            <a:spAutoFit/>
+          </a:bodyPr>
+          <a:lstStyle/>
+          <a:p>
+            <a:r>
+              <a:rPr lang="en-US" sz="2800" dirty="0">
+                <a:solidFill>
+                  <a:srgbClr val="002060"/>
+                </a:solidFill>
+              </a:rPr>
+              <a:t>Completion during recitation: </a:t>
+            </a:r>
+          </a:p>
+        </p:txBody>
+      </p:sp>
+      <p:sp>
+        <p:nvSpPr>
+          <p:cNvPr id="6" name="TextBox 5">
+            <a:extLst>
+              <a:ext uri="{FF2B5EF4-FFF2-40B4-BE49-F238E27FC236}">
+                <a16:creationId xmlns:a16="http://schemas.microsoft.com/office/drawing/2014/main" id="{7781F371-C441-4523-992A-3E80CDA1AC9F}"/>
+              </a:ext>
+            </a:extLst>
+          </p:cNvPr>
+          <p:cNvSpPr txBox="1"/>
+          <p:nvPr/>
+        </p:nvSpPr>
+        <p:spPr>
+          <a:xfrm>
+            <a:off x="424070" y="619420"/>
+            <a:ext cx="8479881" cy="1569660"/>
+          </a:xfrm>
+          <a:prstGeom prst="rect">
+            <a:avLst/>
+          </a:prstGeom>
+          <a:noFill/>
+        </p:spPr>
+        <p:txBody>
+          <a:bodyPr wrap="square" rtlCol="0">
+            <a:spAutoFit/>
+          </a:bodyPr>
+          <a:lstStyle/>
+          <a:p>
+            <a:pPr marL="285750" indent="-285750">
+              <a:buFont typeface="Arial" panose="020B0604020202020204" pitchFamily="34" charset="0"/>
+              <a:buChar char="•"/>
+            </a:pPr>
+            <a:r>
+              <a:rPr lang="en-US" sz="2400" dirty="0"/>
+              <a:t>You will be asked to show the circuits you made, and to try a few test inputs for the 4- and 8-bit adders.</a:t>
+            </a:r>
+          </a:p>
+          <a:p>
+            <a:pPr marL="285750" indent="-285750">
+              <a:buFont typeface="Arial" panose="020B0604020202020204" pitchFamily="34" charset="0"/>
+              <a:buChar char="•"/>
+            </a:pPr>
+            <a:endParaRPr lang="en-US" sz="2400" dirty="0"/>
+          </a:p>
+          <a:p>
+            <a:pPr marL="285750" indent="-285750">
+              <a:buFont typeface="Arial" panose="020B0604020202020204" pitchFamily="34" charset="0"/>
+              <a:buChar char="•"/>
+            </a:pPr>
+            <a:r>
+              <a:rPr lang="en-US" sz="2400" dirty="0"/>
+              <a:t>All labs should be submitted via </a:t>
+            </a:r>
+            <a:r>
+              <a:rPr lang="en-US" sz="2400" dirty="0" err="1"/>
+              <a:t>Courseweb</a:t>
+            </a:r>
+            <a:r>
+              <a:rPr lang="en-US" sz="2400" dirty="0"/>
+              <a:t> by the deadline.</a:t>
+            </a:r>
+          </a:p>
+        </p:txBody>
+      </p:sp>
+    </p:spTree>
+    <p:extLst>
+      <p:ext uri="{BB962C8B-B14F-4D97-AF65-F5344CB8AC3E}">
+        <p14:creationId xmlns:p14="http://schemas.microsoft.com/office/powerpoint/2010/main" val="801330117"/>
       </p:ext>
     </p:extLst>
   </p:cSld>

</xml_diff>